<commit_message>
FIXED THE MONITORING FROM WEBCAM PROBLEM OF NOT TURNING OFF; ADDED CAMERA INTO TRANSLATION-FRAME; MODIFIED THE cam_in_tkinter.pyw file
</commit_message>
<xml_diff>
--- a/visionXplorer ppt files/visionXplorer.pptx
+++ b/visionXplorer ppt files/visionXplorer.pptx
@@ -207,7 +207,7 @@
           <a:p>
             <a:fld id="{90C61749-E9B1-4585-88E5-B9C430F5F061}" type="datetimeFigureOut">
               <a:rPr lang="en-US" smtClean="0"/>
-              <a:t>23-Nov-23</a:t>
+              <a:t>24-Nov-23</a:t>
             </a:fld>
             <a:endParaRPr lang="en-US"/>
           </a:p>
@@ -839,7 +839,7 @@
           <a:p>
             <a:fld id="{965DCD5F-7DAF-4FE9-8EAD-690011DE767E}" type="datetimeFigureOut">
               <a:rPr lang="en-US" smtClean="0"/>
-              <a:t>23-Nov-23</a:t>
+              <a:t>24-Nov-23</a:t>
             </a:fld>
             <a:endParaRPr lang="en-US"/>
           </a:p>
@@ -1037,7 +1037,7 @@
           <a:p>
             <a:fld id="{965DCD5F-7DAF-4FE9-8EAD-690011DE767E}" type="datetimeFigureOut">
               <a:rPr lang="en-US" smtClean="0"/>
-              <a:t>23-Nov-23</a:t>
+              <a:t>24-Nov-23</a:t>
             </a:fld>
             <a:endParaRPr lang="en-US"/>
           </a:p>
@@ -1245,7 +1245,7 @@
           <a:p>
             <a:fld id="{965DCD5F-7DAF-4FE9-8EAD-690011DE767E}" type="datetimeFigureOut">
               <a:rPr lang="en-US" smtClean="0"/>
-              <a:t>23-Nov-23</a:t>
+              <a:t>24-Nov-23</a:t>
             </a:fld>
             <a:endParaRPr lang="en-US"/>
           </a:p>
@@ -1689,7 +1689,7 @@
           <a:p>
             <a:fld id="{965DCD5F-7DAF-4FE9-8EAD-690011DE767E}" type="datetimeFigureOut">
               <a:rPr lang="en-US" smtClean="0"/>
-              <a:t>23-Nov-23</a:t>
+              <a:t>24-Nov-23</a:t>
             </a:fld>
             <a:endParaRPr lang="en-US"/>
           </a:p>
@@ -1964,7 +1964,7 @@
           <a:p>
             <a:fld id="{965DCD5F-7DAF-4FE9-8EAD-690011DE767E}" type="datetimeFigureOut">
               <a:rPr lang="en-US" smtClean="0"/>
-              <a:t>23-Nov-23</a:t>
+              <a:t>24-Nov-23</a:t>
             </a:fld>
             <a:endParaRPr lang="en-US"/>
           </a:p>
@@ -2229,7 +2229,7 @@
           <a:p>
             <a:fld id="{965DCD5F-7DAF-4FE9-8EAD-690011DE767E}" type="datetimeFigureOut">
               <a:rPr lang="en-US" smtClean="0"/>
-              <a:t>23-Nov-23</a:t>
+              <a:t>24-Nov-23</a:t>
             </a:fld>
             <a:endParaRPr lang="en-US"/>
           </a:p>
@@ -2641,7 +2641,7 @@
           <a:p>
             <a:fld id="{965DCD5F-7DAF-4FE9-8EAD-690011DE767E}" type="datetimeFigureOut">
               <a:rPr lang="en-US" smtClean="0"/>
-              <a:t>23-Nov-23</a:t>
+              <a:t>24-Nov-23</a:t>
             </a:fld>
             <a:endParaRPr lang="en-US"/>
           </a:p>
@@ -2782,7 +2782,7 @@
           <a:p>
             <a:fld id="{965DCD5F-7DAF-4FE9-8EAD-690011DE767E}" type="datetimeFigureOut">
               <a:rPr lang="en-US" smtClean="0"/>
-              <a:t>23-Nov-23</a:t>
+              <a:t>24-Nov-23</a:t>
             </a:fld>
             <a:endParaRPr lang="en-US"/>
           </a:p>
@@ -2895,7 +2895,7 @@
           <a:p>
             <a:fld id="{965DCD5F-7DAF-4FE9-8EAD-690011DE767E}" type="datetimeFigureOut">
               <a:rPr lang="en-US" smtClean="0"/>
-              <a:t>23-Nov-23</a:t>
+              <a:t>24-Nov-23</a:t>
             </a:fld>
             <a:endParaRPr lang="en-US"/>
           </a:p>
@@ -3206,7 +3206,7 @@
           <a:p>
             <a:fld id="{965DCD5F-7DAF-4FE9-8EAD-690011DE767E}" type="datetimeFigureOut">
               <a:rPr lang="en-US" smtClean="0"/>
-              <a:t>23-Nov-23</a:t>
+              <a:t>24-Nov-23</a:t>
             </a:fld>
             <a:endParaRPr lang="en-US"/>
           </a:p>
@@ -3494,7 +3494,7 @@
           <a:p>
             <a:fld id="{965DCD5F-7DAF-4FE9-8EAD-690011DE767E}" type="datetimeFigureOut">
               <a:rPr lang="en-US" smtClean="0"/>
-              <a:t>23-Nov-23</a:t>
+              <a:t>24-Nov-23</a:t>
             </a:fld>
             <a:endParaRPr lang="en-US"/>
           </a:p>
@@ -3735,7 +3735,7 @@
           <a:p>
             <a:fld id="{965DCD5F-7DAF-4FE9-8EAD-690011DE767E}" type="datetimeFigureOut">
               <a:rPr lang="en-US" smtClean="0"/>
-              <a:t>23-Nov-23</a:t>
+              <a:t>24-Nov-23</a:t>
             </a:fld>
             <a:endParaRPr lang="en-US"/>
           </a:p>
@@ -4478,7 +4478,7 @@
         <p:spPr>
           <a:xfrm>
             <a:off x="75414" y="3723588"/>
-            <a:ext cx="2988025" cy="1446550"/>
+            <a:ext cx="2988025" cy="954107"/>
           </a:xfrm>
           <a:prstGeom prst="rect">
             <a:avLst/>
@@ -4572,26 +4572,6 @@
               <a:t>;</a:t>
             </a:r>
           </a:p>
-          <a:p>
-            <a:r>
-              <a:rPr lang="en-US" sz="3200" b="1" dirty="0">
-                <a:solidFill>
-                  <a:srgbClr val="2D9A9D"/>
-                </a:solidFill>
-                <a:latin typeface="Agency FB" panose="020B0503020202020204" pitchFamily="34" charset="0"/>
-              </a:rPr>
-              <a:t>Coding</a:t>
-            </a:r>
-            <a:r>
-              <a:rPr lang="en-US" sz="2400" b="1" dirty="0">
-                <a:solidFill>
-                  <a:srgbClr val="2D9A9D"/>
-                </a:solidFill>
-                <a:latin typeface="Agency FB" panose="020B0503020202020204" pitchFamily="34" charset="0"/>
-              </a:rPr>
-              <a:t> head;</a:t>
-            </a:r>
-          </a:p>
         </p:txBody>
       </p:sp>
       <p:sp>
@@ -4689,7 +4669,7 @@
         <p:spPr>
           <a:xfrm>
             <a:off x="6314210" y="3871277"/>
-            <a:ext cx="2741097" cy="830997"/>
+            <a:ext cx="2814353" cy="1200329"/>
           </a:xfrm>
           <a:prstGeom prst="rect">
             <a:avLst/>
@@ -4726,7 +4706,7 @@
                 </a:solidFill>
                 <a:latin typeface="Agency FB" panose="020B0503020202020204" pitchFamily="34" charset="0"/>
               </a:rPr>
-              <a:t>Tech support</a:t>
+              <a:t>Junior software developer</a:t>
             </a:r>
             <a:endParaRPr lang="en-US" b="1" dirty="0">
               <a:solidFill>
@@ -4752,7 +4732,7 @@
         <p:spPr>
           <a:xfrm>
             <a:off x="9564981" y="3871277"/>
-            <a:ext cx="2627019" cy="1384995"/>
+            <a:ext cx="2627019" cy="1323439"/>
           </a:xfrm>
           <a:prstGeom prst="rect">
             <a:avLst/>
@@ -4803,20 +4783,14 @@
           </a:p>
           <a:p>
             <a:r>
-              <a:rPr lang="en-US" sz="3200" b="1" dirty="0">
+              <a:rPr lang="en-US" sz="2800" b="1" dirty="0">
                 <a:solidFill>
                   <a:srgbClr val="2D9A9D"/>
                 </a:solidFill>
                 <a:latin typeface="Agency FB" panose="020B0503020202020204" pitchFamily="34" charset="0"/>
               </a:rPr>
-              <a:t>UI developer</a:t>
+              <a:t>Software Head</a:t>
             </a:r>
-            <a:endParaRPr lang="en-US" sz="2400" b="1" dirty="0">
-              <a:solidFill>
-                <a:srgbClr val="2D9A9D"/>
-              </a:solidFill>
-              <a:latin typeface="Agency FB" panose="020B0503020202020204" pitchFamily="34" charset="0"/>
-            </a:endParaRPr>
           </a:p>
         </p:txBody>
       </p:sp>
@@ -5315,7 +5289,7 @@
         <p:spPr>
           <a:xfrm>
             <a:off x="4155440" y="1659285"/>
-            <a:ext cx="8036560" cy="3970318"/>
+            <a:ext cx="8036560" cy="3539430"/>
           </a:xfrm>
           <a:prstGeom prst="rect">
             <a:avLst/>
@@ -5335,7 +5309,7 @@
                 </a:solidFill>
                 <a:latin typeface="Agency FB" panose="020B0503020202020204" pitchFamily="34" charset="0"/>
               </a:rPr>
-              <a:t>Our cutting-edge product is a pair of smart glasses designed to revolutionize how we perceive and interact with the world. Featuring live text translation, augmented reality, monitoring and navigation functionalities, these glasses provide users with real-time language translation, immersive digital overlays, and seamless guidance through their surroundings. With these features, our smart glasses open up new possibilities for communication, information access, and exploration, making them a must-have innovation for tech-savvy individuals.</a:t>
+              <a:t>Our cutting-edge product is a pair of smart glasses designed to revolutionize how we perceive and interact with the world. Featuring live text translation, monitoring and navigation functionalities, these glasses provide users with real-time language translation, immersive digital overlays, and seamless guidance through their surroundings. With these features, our smart glasses open up new possibilities for communication, information access, and exploration, making them a must-have innovation for tech-savvy individuals.</a:t>
             </a:r>
           </a:p>
         </p:txBody>

</xml_diff>